<commit_message>
removed some unnecessary data, replotted
</commit_message>
<xml_diff>
--- a/plots/plot_summary.pptx
+++ b/plots/plot_summary.pptx
@@ -2964,9 +2964,209 @@
           <a:chExt cx="0" cy="0"/>
         </a:xfrm>
       </p:grpSpPr>
+      <p:sp>
+        <p:nvSpPr>
+          <p:cNvPr id="9" name="Rectangle 8"/>
+          <p:cNvSpPr/>
+          <p:nvPr/>
+        </p:nvSpPr>
+        <p:spPr>
+          <a:xfrm>
+            <a:off x="7859638" y="964780"/>
+            <a:ext cx="45719" cy="5697940"/>
+          </a:xfrm>
+          <a:prstGeom prst="rect">
+            <a:avLst/>
+          </a:prstGeom>
+        </p:spPr>
+        <p:style>
+          <a:lnRef idx="2">
+            <a:schemeClr val="accent1">
+              <a:shade val="50000"/>
+            </a:schemeClr>
+          </a:lnRef>
+          <a:fillRef idx="1">
+            <a:schemeClr val="accent1"/>
+          </a:fillRef>
+          <a:effectRef idx="0">
+            <a:schemeClr val="accent1"/>
+          </a:effectRef>
+          <a:fontRef idx="minor">
+            <a:schemeClr val="lt1"/>
+          </a:fontRef>
+        </p:style>
+        <p:txBody>
+          <a:bodyPr rtlCol="0" anchor="ctr"/>
+          <a:lstStyle/>
+          <a:p>
+            <a:pPr algn="ctr"/>
+            <a:endParaRPr lang="en-US"/>
+          </a:p>
+        </p:txBody>
+      </p:sp>
+      <p:sp>
+        <p:nvSpPr>
+          <p:cNvPr id="11" name="Rectangle 10"/>
+          <p:cNvSpPr/>
+          <p:nvPr/>
+        </p:nvSpPr>
+        <p:spPr>
+          <a:xfrm flipV="1">
+            <a:off x="1073935" y="3531569"/>
+            <a:ext cx="10909112" cy="45719"/>
+          </a:xfrm>
+          <a:prstGeom prst="rect">
+            <a:avLst/>
+          </a:prstGeom>
+        </p:spPr>
+        <p:style>
+          <a:lnRef idx="2">
+            <a:schemeClr val="accent1">
+              <a:shade val="50000"/>
+            </a:schemeClr>
+          </a:lnRef>
+          <a:fillRef idx="1">
+            <a:schemeClr val="accent1"/>
+          </a:fillRef>
+          <a:effectRef idx="0">
+            <a:schemeClr val="accent1"/>
+          </a:effectRef>
+          <a:fontRef idx="minor">
+            <a:schemeClr val="lt1"/>
+          </a:fontRef>
+        </p:style>
+        <p:txBody>
+          <a:bodyPr rtlCol="0" anchor="ctr"/>
+          <a:lstStyle/>
+          <a:p>
+            <a:pPr algn="ctr"/>
+            <a:endParaRPr lang="en-US"/>
+          </a:p>
+        </p:txBody>
+      </p:sp>
+      <p:sp>
+        <p:nvSpPr>
+          <p:cNvPr id="13" name="TextBox 12"/>
+          <p:cNvSpPr txBox="1"/>
+          <p:nvPr/>
+        </p:nvSpPr>
+        <p:spPr>
+          <a:xfrm rot="16200000">
+            <a:off x="-528414" y="1517678"/>
+            <a:ext cx="1433015" cy="369332"/>
+          </a:xfrm>
+          <a:prstGeom prst="rect">
+            <a:avLst/>
+          </a:prstGeom>
+          <a:noFill/>
+        </p:spPr>
+        <p:txBody>
+          <a:bodyPr wrap="square" rtlCol="0">
+            <a:spAutoFit/>
+          </a:bodyPr>
+          <a:lstStyle/>
+          <a:p>
+            <a:r>
+              <a:rPr lang="en-US" dirty="0" smtClean="0"/>
+              <a:t>Female</a:t>
+            </a:r>
+            <a:endParaRPr lang="en-US" dirty="0"/>
+          </a:p>
+        </p:txBody>
+      </p:sp>
+      <p:sp>
+        <p:nvSpPr>
+          <p:cNvPr id="14" name="TextBox 13"/>
+          <p:cNvSpPr txBox="1"/>
+          <p:nvPr/>
+        </p:nvSpPr>
+        <p:spPr>
+          <a:xfrm>
+            <a:off x="9652585" y="65533"/>
+            <a:ext cx="1433015" cy="369332"/>
+          </a:xfrm>
+          <a:prstGeom prst="rect">
+            <a:avLst/>
+          </a:prstGeom>
+          <a:noFill/>
+        </p:spPr>
+        <p:txBody>
+          <a:bodyPr wrap="square" rtlCol="0">
+            <a:spAutoFit/>
+          </a:bodyPr>
+          <a:lstStyle/>
+          <a:p>
+            <a:r>
+              <a:rPr lang="en-US" dirty="0" smtClean="0"/>
+              <a:t>MYSO</a:t>
+            </a:r>
+            <a:endParaRPr lang="en-US" dirty="0"/>
+          </a:p>
+        </p:txBody>
+      </p:sp>
+      <p:sp>
+        <p:nvSpPr>
+          <p:cNvPr id="15" name="TextBox 14"/>
+          <p:cNvSpPr txBox="1"/>
+          <p:nvPr/>
+        </p:nvSpPr>
+        <p:spPr>
+          <a:xfrm>
+            <a:off x="4010497" y="-6274"/>
+            <a:ext cx="1433015" cy="369332"/>
+          </a:xfrm>
+          <a:prstGeom prst="rect">
+            <a:avLst/>
+          </a:prstGeom>
+          <a:noFill/>
+        </p:spPr>
+        <p:txBody>
+          <a:bodyPr wrap="square" rtlCol="0">
+            <a:spAutoFit/>
+          </a:bodyPr>
+          <a:lstStyle/>
+          <a:p>
+            <a:r>
+              <a:rPr lang="en-US" dirty="0" smtClean="0"/>
+              <a:t>MYSE</a:t>
+            </a:r>
+            <a:endParaRPr lang="en-US" dirty="0"/>
+          </a:p>
+        </p:txBody>
+      </p:sp>
+      <p:sp>
+        <p:nvSpPr>
+          <p:cNvPr id="16" name="TextBox 15"/>
+          <p:cNvSpPr txBox="1"/>
+          <p:nvPr/>
+        </p:nvSpPr>
+        <p:spPr>
+          <a:xfrm rot="16200000">
+            <a:off x="-510111" y="4891880"/>
+            <a:ext cx="1433015" cy="369332"/>
+          </a:xfrm>
+          <a:prstGeom prst="rect">
+            <a:avLst/>
+          </a:prstGeom>
+          <a:noFill/>
+        </p:spPr>
+        <p:txBody>
+          <a:bodyPr wrap="square" rtlCol="0">
+            <a:spAutoFit/>
+          </a:bodyPr>
+          <a:lstStyle/>
+          <a:p>
+            <a:r>
+              <a:rPr lang="en-US" dirty="0" smtClean="0"/>
+              <a:t>Male</a:t>
+            </a:r>
+            <a:endParaRPr lang="en-US" dirty="0"/>
+          </a:p>
+        </p:txBody>
+      </p:sp>
       <p:pic>
         <p:nvPicPr>
-          <p:cNvPr id="21" name="Picture 20"/>
+          <p:cNvPr id="35" name="Picture 34"/>
           <p:cNvPicPr>
             <a:picLocks noChangeAspect="1"/>
           </p:cNvPicPr>
@@ -2986,217 +3186,17 @@
         </p:blipFill>
         <p:spPr>
           <a:xfrm>
-            <a:off x="7992804" y="4430150"/>
-            <a:ext cx="1951397" cy="1507478"/>
+            <a:off x="964038" y="671546"/>
+            <a:ext cx="2107542" cy="1275767"/>
           </a:xfrm>
           <a:prstGeom prst="rect">
             <a:avLst/>
           </a:prstGeom>
         </p:spPr>
       </p:pic>
-      <p:sp>
-        <p:nvSpPr>
-          <p:cNvPr id="9" name="Rectangle 8"/>
-          <p:cNvSpPr/>
-          <p:nvPr/>
-        </p:nvSpPr>
-        <p:spPr>
-          <a:xfrm>
-            <a:off x="7859638" y="964780"/>
-            <a:ext cx="45719" cy="5697940"/>
-          </a:xfrm>
-          <a:prstGeom prst="rect">
-            <a:avLst/>
-          </a:prstGeom>
-        </p:spPr>
-        <p:style>
-          <a:lnRef idx="2">
-            <a:schemeClr val="accent1">
-              <a:shade val="50000"/>
-            </a:schemeClr>
-          </a:lnRef>
-          <a:fillRef idx="1">
-            <a:schemeClr val="accent1"/>
-          </a:fillRef>
-          <a:effectRef idx="0">
-            <a:schemeClr val="accent1"/>
-          </a:effectRef>
-          <a:fontRef idx="minor">
-            <a:schemeClr val="lt1"/>
-          </a:fontRef>
-        </p:style>
-        <p:txBody>
-          <a:bodyPr rtlCol="0" anchor="ctr"/>
-          <a:lstStyle/>
-          <a:p>
-            <a:pPr algn="ctr"/>
-            <a:endParaRPr lang="en-US"/>
-          </a:p>
-        </p:txBody>
-      </p:sp>
-      <p:sp>
-        <p:nvSpPr>
-          <p:cNvPr id="11" name="Rectangle 10"/>
-          <p:cNvSpPr/>
-          <p:nvPr/>
-        </p:nvSpPr>
-        <p:spPr>
-          <a:xfrm flipV="1">
-            <a:off x="1073935" y="3531569"/>
-            <a:ext cx="10909112" cy="45719"/>
-          </a:xfrm>
-          <a:prstGeom prst="rect">
-            <a:avLst/>
-          </a:prstGeom>
-        </p:spPr>
-        <p:style>
-          <a:lnRef idx="2">
-            <a:schemeClr val="accent1">
-              <a:shade val="50000"/>
-            </a:schemeClr>
-          </a:lnRef>
-          <a:fillRef idx="1">
-            <a:schemeClr val="accent1"/>
-          </a:fillRef>
-          <a:effectRef idx="0">
-            <a:schemeClr val="accent1"/>
-          </a:effectRef>
-          <a:fontRef idx="minor">
-            <a:schemeClr val="lt1"/>
-          </a:fontRef>
-        </p:style>
-        <p:txBody>
-          <a:bodyPr rtlCol="0" anchor="ctr"/>
-          <a:lstStyle/>
-          <a:p>
-            <a:pPr algn="ctr"/>
-            <a:endParaRPr lang="en-US"/>
-          </a:p>
-        </p:txBody>
-      </p:sp>
-      <p:sp>
-        <p:nvSpPr>
-          <p:cNvPr id="13" name="TextBox 12"/>
-          <p:cNvSpPr txBox="1"/>
-          <p:nvPr/>
-        </p:nvSpPr>
-        <p:spPr>
-          <a:xfrm rot="16200000">
-            <a:off x="-528414" y="1517678"/>
-            <a:ext cx="1433015" cy="369332"/>
-          </a:xfrm>
-          <a:prstGeom prst="rect">
-            <a:avLst/>
-          </a:prstGeom>
-          <a:noFill/>
-        </p:spPr>
-        <p:txBody>
-          <a:bodyPr wrap="square" rtlCol="0">
-            <a:spAutoFit/>
-          </a:bodyPr>
-          <a:lstStyle/>
-          <a:p>
-            <a:r>
-              <a:rPr lang="en-US" dirty="0" smtClean="0"/>
-              <a:t>Female</a:t>
-            </a:r>
-            <a:endParaRPr lang="en-US" dirty="0"/>
-          </a:p>
-        </p:txBody>
-      </p:sp>
-      <p:sp>
-        <p:nvSpPr>
-          <p:cNvPr id="14" name="TextBox 13"/>
-          <p:cNvSpPr txBox="1"/>
-          <p:nvPr/>
-        </p:nvSpPr>
-        <p:spPr>
-          <a:xfrm>
-            <a:off x="9652585" y="65533"/>
-            <a:ext cx="1433015" cy="369332"/>
-          </a:xfrm>
-          <a:prstGeom prst="rect">
-            <a:avLst/>
-          </a:prstGeom>
-          <a:noFill/>
-        </p:spPr>
-        <p:txBody>
-          <a:bodyPr wrap="square" rtlCol="0">
-            <a:spAutoFit/>
-          </a:bodyPr>
-          <a:lstStyle/>
-          <a:p>
-            <a:r>
-              <a:rPr lang="en-US" dirty="0" smtClean="0"/>
-              <a:t>MYSO</a:t>
-            </a:r>
-            <a:endParaRPr lang="en-US" dirty="0"/>
-          </a:p>
-        </p:txBody>
-      </p:sp>
-      <p:sp>
-        <p:nvSpPr>
-          <p:cNvPr id="15" name="TextBox 14"/>
-          <p:cNvSpPr txBox="1"/>
-          <p:nvPr/>
-        </p:nvSpPr>
-        <p:spPr>
-          <a:xfrm>
-            <a:off x="4010497" y="-6274"/>
-            <a:ext cx="1433015" cy="369332"/>
-          </a:xfrm>
-          <a:prstGeom prst="rect">
-            <a:avLst/>
-          </a:prstGeom>
-          <a:noFill/>
-        </p:spPr>
-        <p:txBody>
-          <a:bodyPr wrap="square" rtlCol="0">
-            <a:spAutoFit/>
-          </a:bodyPr>
-          <a:lstStyle/>
-          <a:p>
-            <a:r>
-              <a:rPr lang="en-US" dirty="0" smtClean="0"/>
-              <a:t>MYSE</a:t>
-            </a:r>
-            <a:endParaRPr lang="en-US" dirty="0"/>
-          </a:p>
-        </p:txBody>
-      </p:sp>
-      <p:sp>
-        <p:nvSpPr>
-          <p:cNvPr id="16" name="TextBox 15"/>
-          <p:cNvSpPr txBox="1"/>
-          <p:nvPr/>
-        </p:nvSpPr>
-        <p:spPr>
-          <a:xfrm rot="16200000">
-            <a:off x="-510111" y="4891880"/>
-            <a:ext cx="1433015" cy="369332"/>
-          </a:xfrm>
-          <a:prstGeom prst="rect">
-            <a:avLst/>
-          </a:prstGeom>
-          <a:noFill/>
-        </p:spPr>
-        <p:txBody>
-          <a:bodyPr wrap="square" rtlCol="0">
-            <a:spAutoFit/>
-          </a:bodyPr>
-          <a:lstStyle/>
-          <a:p>
-            <a:r>
-              <a:rPr lang="en-US" dirty="0" smtClean="0"/>
-              <a:t>Male</a:t>
-            </a:r>
-            <a:endParaRPr lang="en-US" dirty="0"/>
-          </a:p>
-        </p:txBody>
-      </p:sp>
       <p:pic>
         <p:nvPicPr>
-          <p:cNvPr id="20" name="Picture 19"/>
+          <p:cNvPr id="36" name="Picture 35"/>
           <p:cNvPicPr>
             <a:picLocks noChangeAspect="1"/>
           </p:cNvPicPr>
@@ -3216,8 +3216,8 @@
         </p:blipFill>
         <p:spPr>
           <a:xfrm>
-            <a:off x="875020" y="480616"/>
-            <a:ext cx="2004113" cy="1548201"/>
+            <a:off x="1073935" y="3835339"/>
+            <a:ext cx="2242604" cy="1357525"/>
           </a:xfrm>
           <a:prstGeom prst="rect">
             <a:avLst/>
@@ -3226,7 +3226,7 @@
       </p:pic>
       <p:pic>
         <p:nvPicPr>
-          <p:cNvPr id="22" name="Picture 21"/>
+          <p:cNvPr id="37" name="Picture 36"/>
           <p:cNvPicPr>
             <a:picLocks noChangeAspect="1"/>
           </p:cNvPicPr>
@@ -3246,8 +3246,8 @@
         </p:blipFill>
         <p:spPr>
           <a:xfrm>
-            <a:off x="10037009" y="3712200"/>
-            <a:ext cx="1935975" cy="1495563"/>
+            <a:off x="9943356" y="3603376"/>
+            <a:ext cx="2039691" cy="1234695"/>
           </a:xfrm>
           <a:prstGeom prst="rect">
             <a:avLst/>
@@ -3256,7 +3256,7 @@
       </p:pic>
       <p:pic>
         <p:nvPicPr>
-          <p:cNvPr id="23" name="Picture 22"/>
+          <p:cNvPr id="38" name="Picture 37"/>
           <p:cNvPicPr>
             <a:picLocks noChangeAspect="1"/>
           </p:cNvPicPr>
@@ -3276,8 +3276,8 @@
         </p:blipFill>
         <p:spPr>
           <a:xfrm>
-            <a:off x="5740953" y="3629366"/>
-            <a:ext cx="1908423" cy="1474280"/>
+            <a:off x="9861857" y="5573971"/>
+            <a:ext cx="2121190" cy="1284029"/>
           </a:xfrm>
           <a:prstGeom prst="rect">
             <a:avLst/>
@@ -3286,7 +3286,7 @@
       </p:pic>
       <p:pic>
         <p:nvPicPr>
-          <p:cNvPr id="24" name="Picture 23"/>
+          <p:cNvPr id="39" name="Picture 38"/>
           <p:cNvPicPr>
             <a:picLocks noChangeAspect="1"/>
           </p:cNvPicPr>
@@ -3306,8 +3306,8 @@
         </p:blipFill>
         <p:spPr>
           <a:xfrm>
-            <a:off x="5636008" y="449678"/>
-            <a:ext cx="1976210" cy="1526646"/>
+            <a:off x="3494194" y="3880348"/>
+            <a:ext cx="2093894" cy="1267506"/>
           </a:xfrm>
           <a:prstGeom prst="rect">
             <a:avLst/>
@@ -3316,7 +3316,7 @@
       </p:pic>
       <p:pic>
         <p:nvPicPr>
-          <p:cNvPr id="25" name="Picture 24"/>
+          <p:cNvPr id="40" name="Picture 39"/>
           <p:cNvPicPr>
             <a:picLocks noChangeAspect="1"/>
           </p:cNvPicPr>
@@ -3336,8 +3336,8 @@
         </p:blipFill>
         <p:spPr>
           <a:xfrm>
-            <a:off x="1010335" y="4936638"/>
-            <a:ext cx="2333365" cy="1802552"/>
+            <a:off x="3281148" y="666118"/>
+            <a:ext cx="2143242" cy="1297378"/>
           </a:xfrm>
           <a:prstGeom prst="rect">
             <a:avLst/>
@@ -3346,7 +3346,7 @@
       </p:pic>
       <p:pic>
         <p:nvPicPr>
-          <p:cNvPr id="26" name="Picture 25"/>
+          <p:cNvPr id="41" name="Picture 40"/>
           <p:cNvPicPr>
             <a:picLocks noChangeAspect="1"/>
           </p:cNvPicPr>
@@ -3366,8 +3366,8 @@
         </p:blipFill>
         <p:spPr>
           <a:xfrm>
-            <a:off x="4727005" y="5205763"/>
-            <a:ext cx="2110621" cy="1630480"/>
+            <a:off x="5635972" y="3880348"/>
+            <a:ext cx="2175781" cy="1317075"/>
           </a:xfrm>
           <a:prstGeom prst="rect">
             <a:avLst/>
@@ -3376,7 +3376,7 @@
       </p:pic>
       <p:pic>
         <p:nvPicPr>
-          <p:cNvPr id="27" name="Picture 26"/>
+          <p:cNvPr id="42" name="Picture 41"/>
           <p:cNvPicPr>
             <a:picLocks noChangeAspect="1"/>
           </p:cNvPicPr>
@@ -3396,8 +3396,8 @@
         </p:blipFill>
         <p:spPr>
           <a:xfrm>
-            <a:off x="10031648" y="5252673"/>
-            <a:ext cx="1871935" cy="1446092"/>
+            <a:off x="2081683" y="5192864"/>
+            <a:ext cx="2148485" cy="1300552"/>
           </a:xfrm>
           <a:prstGeom prst="rect">
             <a:avLst/>
@@ -3406,7 +3406,7 @@
       </p:pic>
       <p:pic>
         <p:nvPicPr>
-          <p:cNvPr id="28" name="Picture 27"/>
+          <p:cNvPr id="43" name="Picture 42"/>
           <p:cNvPicPr>
             <a:picLocks noChangeAspect="1"/>
           </p:cNvPicPr>
@@ -3426,8 +3426,8 @@
         </p:blipFill>
         <p:spPr>
           <a:xfrm>
-            <a:off x="2207910" y="2029798"/>
-            <a:ext cx="1889045" cy="1459310"/>
+            <a:off x="8013150" y="4668219"/>
+            <a:ext cx="2353201" cy="1424473"/>
           </a:xfrm>
           <a:prstGeom prst="rect">
             <a:avLst/>
@@ -3436,7 +3436,7 @@
       </p:pic>
       <p:pic>
         <p:nvPicPr>
-          <p:cNvPr id="29" name="Picture 28"/>
+          <p:cNvPr id="44" name="Picture 43"/>
           <p:cNvPicPr>
             <a:picLocks noChangeAspect="1"/>
           </p:cNvPicPr>
@@ -3456,8 +3456,8 @@
         </p:blipFill>
         <p:spPr>
           <a:xfrm>
-            <a:off x="3392643" y="3762462"/>
-            <a:ext cx="1903430" cy="1470423"/>
+            <a:off x="5517810" y="699188"/>
+            <a:ext cx="2121190" cy="1284029"/>
           </a:xfrm>
           <a:prstGeom prst="rect">
             <a:avLst/>
@@ -3466,7 +3466,7 @@
       </p:pic>
       <p:pic>
         <p:nvPicPr>
-          <p:cNvPr id="30" name="Picture 29"/>
+          <p:cNvPr id="45" name="Picture 44"/>
           <p:cNvPicPr>
             <a:picLocks noChangeAspect="1"/>
           </p:cNvPicPr>
@@ -3486,8 +3486,8 @@
         </p:blipFill>
         <p:spPr>
           <a:xfrm>
-            <a:off x="5000589" y="1948250"/>
-            <a:ext cx="1969288" cy="1521298"/>
+            <a:off x="4541141" y="5204602"/>
+            <a:ext cx="2143242" cy="1297378"/>
           </a:xfrm>
           <a:prstGeom prst="rect">
             <a:avLst/>
@@ -3496,7 +3496,7 @@
       </p:pic>
       <p:pic>
         <p:nvPicPr>
-          <p:cNvPr id="31" name="Picture 30"/>
+          <p:cNvPr id="46" name="Picture 45"/>
           <p:cNvPicPr>
             <a:picLocks noChangeAspect="1"/>
           </p:cNvPicPr>
@@ -3516,8 +3516,8 @@
         </p:blipFill>
         <p:spPr>
           <a:xfrm>
-            <a:off x="8901201" y="1272557"/>
-            <a:ext cx="2085999" cy="1611459"/>
+            <a:off x="1992972" y="2019806"/>
+            <a:ext cx="2325906" cy="1407951"/>
           </a:xfrm>
           <a:prstGeom prst="rect">
             <a:avLst/>
@@ -3526,7 +3526,7 @@
       </p:pic>
       <p:pic>
         <p:nvPicPr>
-          <p:cNvPr id="32" name="Picture 31"/>
+          <p:cNvPr id="47" name="Picture 46"/>
           <p:cNvPicPr>
             <a:picLocks noChangeAspect="1"/>
           </p:cNvPicPr>
@@ -3546,8 +3546,38 @@
         </p:blipFill>
         <p:spPr>
           <a:xfrm>
-            <a:off x="3203092" y="476270"/>
-            <a:ext cx="1996623" cy="1542415"/>
+            <a:off x="8965150" y="1348896"/>
+            <a:ext cx="2203076" cy="1333597"/>
+          </a:xfrm>
+          <a:prstGeom prst="rect">
+            <a:avLst/>
+          </a:prstGeom>
+        </p:spPr>
+      </p:pic>
+      <p:pic>
+        <p:nvPicPr>
+          <p:cNvPr id="48" name="Picture 47"/>
+          <p:cNvPicPr>
+            <a:picLocks noChangeAspect="1"/>
+          </p:cNvPicPr>
+          <p:nvPr/>
+        </p:nvPicPr>
+        <p:blipFill>
+          <a:blip r:embed="rId15" cstate="print">
+            <a:extLst>
+              <a:ext uri="{28A0092B-C50C-407E-A947-70E740481C1C}">
+                <a14:useLocalDpi xmlns:a14="http://schemas.microsoft.com/office/drawing/2010/main" val="0"/>
+              </a:ext>
+            </a:extLst>
+          </a:blip>
+          <a:stretch>
+            <a:fillRect/>
+          </a:stretch>
+        </p:blipFill>
+        <p:spPr>
+          <a:xfrm>
+            <a:off x="4539516" y="2035006"/>
+            <a:ext cx="2377880" cy="1439412"/>
           </a:xfrm>
           <a:prstGeom prst="rect">
             <a:avLst/>

</xml_diff>